<commit_message>
new change for s2
</commit_message>
<xml_diff>
--- a/slides/S2_ControlChart_0418.pptx
+++ b/slides/S2_ControlChart_0418.pptx
@@ -359,14 +359,14 @@
           </a:ln>
           <a:extLst>
             <a:ext uri="{909E8E84-426E-40dd-AFC4-6F175D3DCCD1}">
-              <a14:hiddenFill xmlns:a14="http://schemas.microsoft.com/office/drawing/2010/main" xmlns="">
+              <a14:hiddenFill xmlns="" xmlns:a14="http://schemas.microsoft.com/office/drawing/2010/main">
                 <a:solidFill>
                   <a:srgbClr val="FFFFFF"/>
                 </a:solidFill>
               </a14:hiddenFill>
             </a:ext>
             <a:ext uri="{91240B29-F687-4f45-9708-019B960494DF}">
-              <a14:hiddenLine xmlns:a14="http://schemas.microsoft.com/office/drawing/2010/main" xmlns="" w="9525">
+              <a14:hiddenLine xmlns="" xmlns:a14="http://schemas.microsoft.com/office/drawing/2010/main" w="9525">
                 <a:solidFill>
                   <a:srgbClr val="000000"/>
                 </a:solidFill>
@@ -471,14 +471,14 @@
           </a:ln>
           <a:extLst>
             <a:ext uri="{909E8E84-426E-40dd-AFC4-6F175D3DCCD1}">
-              <a14:hiddenFill xmlns:a14="http://schemas.microsoft.com/office/drawing/2010/main" xmlns="">
+              <a14:hiddenFill xmlns="" xmlns:a14="http://schemas.microsoft.com/office/drawing/2010/main">
                 <a:solidFill>
                   <a:srgbClr val="FFFFFF"/>
                 </a:solidFill>
               </a14:hiddenFill>
             </a:ext>
             <a:ext uri="{91240B29-F687-4f45-9708-019B960494DF}">
-              <a14:hiddenLine xmlns:a14="http://schemas.microsoft.com/office/drawing/2010/main" xmlns="" w="9525">
+              <a14:hiddenLine xmlns="" xmlns:a14="http://schemas.microsoft.com/office/drawing/2010/main" w="9525">
                 <a:solidFill>
                   <a:srgbClr val="000000"/>
                 </a:solidFill>
@@ -1351,14 +1351,14 @@
           </a:ln>
           <a:extLst>
             <a:ext uri="{909E8E84-426E-40dd-AFC4-6F175D3DCCD1}">
-              <a14:hiddenFill xmlns:a14="http://schemas.microsoft.com/office/drawing/2010/main" xmlns="">
+              <a14:hiddenFill xmlns="" xmlns:a14="http://schemas.microsoft.com/office/drawing/2010/main">
                 <a:solidFill>
                   <a:srgbClr val="FFFFFF"/>
                 </a:solidFill>
               </a14:hiddenFill>
             </a:ext>
             <a:ext uri="{91240B29-F687-4f45-9708-019B960494DF}">
-              <a14:hiddenLine xmlns:a14="http://schemas.microsoft.com/office/drawing/2010/main" xmlns="" w="9525">
+              <a14:hiddenLine xmlns="" xmlns:a14="http://schemas.microsoft.com/office/drawing/2010/main" w="9525">
                 <a:solidFill>
                   <a:srgbClr val="000000"/>
                 </a:solidFill>
@@ -3594,14 +3594,14 @@
           </a:ln>
           <a:extLst>
             <a:ext uri="{909E8E84-426E-40dd-AFC4-6F175D3DCCD1}">
-              <a14:hiddenFill xmlns:a14="http://schemas.microsoft.com/office/drawing/2010/main" xmlns="">
+              <a14:hiddenFill xmlns="" xmlns:a14="http://schemas.microsoft.com/office/drawing/2010/main">
                 <a:solidFill>
                   <a:srgbClr val="FFFFFF"/>
                 </a:solidFill>
               </a14:hiddenFill>
             </a:ext>
             <a:ext uri="{91240B29-F687-4f45-9708-019B960494DF}">
-              <a14:hiddenLine xmlns:a14="http://schemas.microsoft.com/office/drawing/2010/main" xmlns="" w="9525">
+              <a14:hiddenLine xmlns="" xmlns:a14="http://schemas.microsoft.com/office/drawing/2010/main" w="9525">
                 <a:solidFill>
                   <a:srgbClr val="000000"/>
                 </a:solidFill>
@@ -3652,14 +3652,14 @@
           </a:ln>
           <a:extLst>
             <a:ext uri="{909E8E84-426E-40dd-AFC4-6F175D3DCCD1}">
-              <a14:hiddenFill xmlns:a14="http://schemas.microsoft.com/office/drawing/2010/main" xmlns="">
+              <a14:hiddenFill xmlns="" xmlns:a14="http://schemas.microsoft.com/office/drawing/2010/main">
                 <a:solidFill>
                   <a:srgbClr val="FFFFFF"/>
                 </a:solidFill>
               </a14:hiddenFill>
             </a:ext>
             <a:ext uri="{91240B29-F687-4f45-9708-019B960494DF}">
-              <a14:hiddenLine xmlns:a14="http://schemas.microsoft.com/office/drawing/2010/main" xmlns="" w="9525">
+              <a14:hiddenLine xmlns="" xmlns:a14="http://schemas.microsoft.com/office/drawing/2010/main" w="9525">
                 <a:solidFill>
                   <a:srgbClr val="000000"/>
                 </a:solidFill>
@@ -4958,12 +4958,23 @@
           <a:p>
             <a:r>
               <a:rPr lang="en-US" dirty="0" smtClean="0"/>
-              <a:t>T-test(mean)</a:t>
+              <a:t>T-test(mean</a:t>
+            </a:r>
+            <a:r>
+              <a:rPr lang="en-US" dirty="0" smtClean="0"/>
+              <a:t>)</a:t>
             </a:r>
           </a:p>
           <a:p>
             <a:r>
               <a:rPr lang="en-US" smtClean="0"/>
+              <a:t>Z-test(mean)</a:t>
+            </a:r>
+            <a:endParaRPr lang="en-US" dirty="0" smtClean="0"/>
+          </a:p>
+          <a:p>
+            <a:r>
+              <a:rPr lang="en-US" dirty="0" smtClean="0"/>
               <a:t>F-test(variance)</a:t>
             </a:r>
             <a:endParaRPr lang="en-US" dirty="0"/>

</xml_diff>